<commit_message>
Adicionando diagrama EE ao diretório
</commit_message>
<xml_diff>
--- a/OdontoProj/Controle de Consultório Odontológico-turma 610.pptx
+++ b/OdontoProj/Controle de Consultório Odontológico-turma 610.pptx
@@ -16,8 +16,9 @@
     <p:sldId id="263" r:id="rId10"/>
     <p:sldId id="260" r:id="rId11"/>
     <p:sldId id="261" r:id="rId12"/>
-    <p:sldId id="269" r:id="rId13"/>
-    <p:sldId id="270" r:id="rId14"/>
+    <p:sldId id="271" r:id="rId13"/>
+    <p:sldId id="269" r:id="rId14"/>
+    <p:sldId id="270" r:id="rId15"/>
   </p:sldIdLst>
   <p:sldSz cx="9144000" cy="6858000" type="screen4x3"/>
   <p:notesSz cx="6858000" cy="9144000"/>
@@ -746,7 +747,7 @@
           <a:p>
             <a:fld id="{2E700DB3-DBF0-4086-B675-117E7A9610B8}" type="datetimeFigureOut">
               <a:rPr lang="pt-BR" smtClean="0"/>
-              <a:t>06/10/2014</a:t>
+              <a:t>21/11/2014</a:t>
             </a:fld>
             <a:endParaRPr lang="pt-BR" dirty="0"/>
           </a:p>
@@ -925,7 +926,7 @@
           <a:p>
             <a:fld id="{2E700DB3-DBF0-4086-B675-117E7A9610B8}" type="datetimeFigureOut">
               <a:rPr lang="pt-BR" smtClean="0"/>
-              <a:t>06/10/2014</a:t>
+              <a:t>21/11/2014</a:t>
             </a:fld>
             <a:endParaRPr lang="pt-BR" dirty="0"/>
           </a:p>
@@ -1104,7 +1105,7 @@
           <a:p>
             <a:fld id="{2E700DB3-DBF0-4086-B675-117E7A9610B8}" type="datetimeFigureOut">
               <a:rPr lang="pt-BR" smtClean="0"/>
-              <a:t>06/10/2014</a:t>
+              <a:t>21/11/2014</a:t>
             </a:fld>
             <a:endParaRPr lang="pt-BR" dirty="0"/>
           </a:p>
@@ -1269,7 +1270,7 @@
           <a:p>
             <a:fld id="{2E700DB3-DBF0-4086-B675-117E7A9610B8}" type="datetimeFigureOut">
               <a:rPr lang="pt-BR" smtClean="0"/>
-              <a:t>06/10/2014</a:t>
+              <a:t>21/11/2014</a:t>
             </a:fld>
             <a:endParaRPr lang="pt-BR" dirty="0"/>
           </a:p>
@@ -1508,7 +1509,7 @@
           <a:p>
             <a:fld id="{2E700DB3-DBF0-4086-B675-117E7A9610B8}" type="datetimeFigureOut">
               <a:rPr lang="pt-BR" smtClean="0"/>
-              <a:t>06/10/2014</a:t>
+              <a:t>21/11/2014</a:t>
             </a:fld>
             <a:endParaRPr lang="pt-BR" dirty="0"/>
           </a:p>
@@ -1621,7 +1622,7 @@
           <a:p>
             <a:fld id="{2E700DB3-DBF0-4086-B675-117E7A9610B8}" type="datetimeFigureOut">
               <a:rPr lang="pt-BR" smtClean="0"/>
-              <a:t>06/10/2014</a:t>
+              <a:t>21/11/2014</a:t>
             </a:fld>
             <a:endParaRPr lang="pt-BR" dirty="0"/>
           </a:p>
@@ -1994,7 +1995,7 @@
           <a:p>
             <a:fld id="{2E700DB3-DBF0-4086-B675-117E7A9610B8}" type="datetimeFigureOut">
               <a:rPr lang="pt-BR" smtClean="0"/>
-              <a:t>06/10/2014</a:t>
+              <a:t>21/11/2014</a:t>
             </a:fld>
             <a:endParaRPr lang="pt-BR" dirty="0"/>
           </a:p>
@@ -2221,7 +2222,7 @@
           <a:p>
             <a:fld id="{2E700DB3-DBF0-4086-B675-117E7A9610B8}" type="datetimeFigureOut">
               <a:rPr lang="pt-BR" smtClean="0"/>
-              <a:t>06/10/2014</a:t>
+              <a:t>21/11/2014</a:t>
             </a:fld>
             <a:endParaRPr lang="pt-BR" dirty="0"/>
           </a:p>
@@ -2311,7 +2312,7 @@
           <a:p>
             <a:fld id="{2E700DB3-DBF0-4086-B675-117E7A9610B8}" type="datetimeFigureOut">
               <a:rPr lang="pt-BR" smtClean="0"/>
-              <a:t>06/10/2014</a:t>
+              <a:t>21/11/2014</a:t>
             </a:fld>
             <a:endParaRPr lang="pt-BR" dirty="0"/>
           </a:p>
@@ -3138,7 +3139,7 @@
           <a:p>
             <a:fld id="{2E700DB3-DBF0-4086-B675-117E7A9610B8}" type="datetimeFigureOut">
               <a:rPr lang="pt-BR" smtClean="0"/>
-              <a:t>06/10/2014</a:t>
+              <a:t>21/11/2014</a:t>
             </a:fld>
             <a:endParaRPr lang="pt-BR" dirty="0"/>
           </a:p>
@@ -3969,7 +3970,7 @@
           <a:p>
             <a:fld id="{2E700DB3-DBF0-4086-B675-117E7A9610B8}" type="datetimeFigureOut">
               <a:rPr lang="pt-BR" smtClean="0"/>
-              <a:t>06/10/2014</a:t>
+              <a:t>21/11/2014</a:t>
             </a:fld>
             <a:endParaRPr lang="pt-BR" dirty="0"/>
           </a:p>
@@ -4623,7 +4624,7 @@
           <a:p>
             <a:fld id="{2E700DB3-DBF0-4086-B675-117E7A9610B8}" type="datetimeFigureOut">
               <a:rPr lang="pt-BR" smtClean="0"/>
-              <a:t>06/10/2014</a:t>
+              <a:t>21/11/2014</a:t>
             </a:fld>
             <a:endParaRPr lang="pt-BR" dirty="0"/>
           </a:p>
@@ -6605,7 +6606,7 @@
           <p:nvPr>
             <p:extLst>
               <p:ext uri="{D42A27DB-BD31-4B8C-83A1-F6EECF244321}">
-                <p14:modId xmlns:p14="http://schemas.microsoft.com/office/powerpoint/2010/main" val="3069458601"/>
+                <p14:modId xmlns:p14="http://schemas.microsoft.com/office/powerpoint/2010/main" val="3999785914"/>
               </p:ext>
             </p:extLst>
           </p:nvPr>
@@ -7135,7 +7136,7 @@
                           <a:latin typeface="Arial Rounded MT Bold" panose="020F0704030504030204" pitchFamily="34" charset="0"/>
                           <a:cs typeface="Arial" panose="020B0604020202020204" pitchFamily="34" charset="0"/>
                         </a:rPr>
-                        <a:t>Integração</a:t>
+                        <a:t>Implementação</a:t>
                       </a:r>
                       <a:r>
                         <a:rPr lang="pt-BR" sz="1400" baseline="0" dirty="0" smtClean="0">
@@ -7149,7 +7150,7 @@
                           <a:latin typeface="Arial Rounded MT Bold" panose="020F0704030504030204" pitchFamily="34" charset="0"/>
                           <a:cs typeface="Arial" panose="020B0604020202020204" pitchFamily="34" charset="0"/>
                         </a:rPr>
-                        <a:t> da 2ª versão.</a:t>
+                        <a:t> da classe Tratamento.</a:t>
                       </a:r>
                     </a:p>
                     <a:p>
@@ -7169,29 +7170,9 @@
                           <a:latin typeface="Arial Rounded MT Bold" panose="020F0704030504030204" pitchFamily="34" charset="0"/>
                           <a:cs typeface="Arial" panose="020B0604020202020204" pitchFamily="34" charset="0"/>
                         </a:rPr>
-                        <a:t>2º teste.</a:t>
+                        <a:t>Integração com o sistema.</a:t>
                       </a:r>
-                    </a:p>
-                    <a:p>
-                      <a:pPr marL="285750" indent="-285750">
-                        <a:buFont typeface="Arial" panose="020B0604020202020204" pitchFamily="34" charset="0"/>
-                        <a:buChar char="•"/>
-                      </a:pPr>
-                      <a:r>
-                        <a:rPr lang="pt-BR" sz="1400" baseline="0" dirty="0" smtClean="0">
-                          <a:solidFill>
-                            <a:schemeClr val="tx1">
-                              <a:lumMod val="85000"/>
-                              <a:lumOff val="15000"/>
-                            </a:schemeClr>
-                          </a:solidFill>
-                          <a:effectLst/>
-                          <a:latin typeface="Arial Rounded MT Bold" panose="020F0704030504030204" pitchFamily="34" charset="0"/>
-                          <a:cs typeface="Arial" panose="020B0604020202020204" pitchFamily="34" charset="0"/>
-                        </a:rPr>
-                        <a:t>Manutenção das unidades.</a:t>
-                      </a:r>
-                      <a:endParaRPr lang="pt-BR" sz="1400" dirty="0">
+                      <a:endParaRPr lang="pt-BR" sz="1400" baseline="0" dirty="0" smtClean="0">
                         <a:solidFill>
                           <a:schemeClr val="tx1">
                             <a:lumMod val="85000"/>
@@ -7285,7 +7266,7 @@
                           <a:latin typeface="Arial Rounded MT Bold" panose="020F0704030504030204" pitchFamily="34" charset="0"/>
                           <a:cs typeface="Arial" panose="020B0604020202020204" pitchFamily="34" charset="0"/>
                         </a:rPr>
-                        <a:t> da 3ª versão.</a:t>
+                        <a:t> da 2ª versão.</a:t>
                       </a:r>
                     </a:p>
                     <a:p>
@@ -7305,7 +7286,7 @@
                           <a:latin typeface="Arial Rounded MT Bold" panose="020F0704030504030204" pitchFamily="34" charset="0"/>
                           <a:cs typeface="Arial" panose="020B0604020202020204" pitchFamily="34" charset="0"/>
                         </a:rPr>
-                        <a:t>3º teste.</a:t>
+                        <a:t>2º teste.</a:t>
                       </a:r>
                     </a:p>
                     <a:p>
@@ -7506,6 +7487,96 @@
           </a:prstGeom>
         </p:spPr>
       </p:pic>
+      <p:pic>
+        <p:nvPicPr>
+          <p:cNvPr id="11" name="Imagem 10"/>
+          <p:cNvPicPr>
+            <a:picLocks noChangeAspect="1"/>
+          </p:cNvPicPr>
+          <p:nvPr/>
+        </p:nvPicPr>
+        <p:blipFill>
+          <a:blip r:embed="rId2" cstate="print">
+            <a:extLst>
+              <a:ext uri="{28A0092B-C50C-407E-A947-70E740481C1C}">
+                <a14:useLocalDpi xmlns:a14="http://schemas.microsoft.com/office/drawing/2010/main" val="0"/>
+              </a:ext>
+            </a:extLst>
+          </a:blip>
+          <a:stretch>
+            <a:fillRect/>
+          </a:stretch>
+        </p:blipFill>
+        <p:spPr>
+          <a:xfrm>
+            <a:off x="7596336" y="3284984"/>
+            <a:ext cx="792088" cy="819591"/>
+          </a:xfrm>
+          <a:prstGeom prst="rect">
+            <a:avLst/>
+          </a:prstGeom>
+        </p:spPr>
+      </p:pic>
+      <p:pic>
+        <p:nvPicPr>
+          <p:cNvPr id="12" name="Imagem 11"/>
+          <p:cNvPicPr>
+            <a:picLocks noChangeAspect="1"/>
+          </p:cNvPicPr>
+          <p:nvPr/>
+        </p:nvPicPr>
+        <p:blipFill>
+          <a:blip r:embed="rId2" cstate="print">
+            <a:extLst>
+              <a:ext uri="{28A0092B-C50C-407E-A947-70E740481C1C}">
+                <a14:useLocalDpi xmlns:a14="http://schemas.microsoft.com/office/drawing/2010/main" val="0"/>
+              </a:ext>
+            </a:extLst>
+          </a:blip>
+          <a:stretch>
+            <a:fillRect/>
+          </a:stretch>
+        </p:blipFill>
+        <p:spPr>
+          <a:xfrm>
+            <a:off x="7600006" y="4293096"/>
+            <a:ext cx="792088" cy="819591"/>
+          </a:xfrm>
+          <a:prstGeom prst="rect">
+            <a:avLst/>
+          </a:prstGeom>
+        </p:spPr>
+      </p:pic>
+      <p:pic>
+        <p:nvPicPr>
+          <p:cNvPr id="14" name="Imagem 13"/>
+          <p:cNvPicPr>
+            <a:picLocks noChangeAspect="1"/>
+          </p:cNvPicPr>
+          <p:nvPr/>
+        </p:nvPicPr>
+        <p:blipFill>
+          <a:blip r:embed="rId2" cstate="print">
+            <a:extLst>
+              <a:ext uri="{28A0092B-C50C-407E-A947-70E740481C1C}">
+                <a14:useLocalDpi xmlns:a14="http://schemas.microsoft.com/office/drawing/2010/main" val="0"/>
+              </a:ext>
+            </a:extLst>
+          </a:blip>
+          <a:stretch>
+            <a:fillRect/>
+          </a:stretch>
+        </p:blipFill>
+        <p:spPr>
+          <a:xfrm>
+            <a:off x="7596336" y="5256703"/>
+            <a:ext cx="792088" cy="819591"/>
+          </a:xfrm>
+          <a:prstGeom prst="rect">
+            <a:avLst/>
+          </a:prstGeom>
+        </p:spPr>
+      </p:pic>
     </p:spTree>
     <p:extLst>
       <p:ext uri="{BB962C8B-B14F-4D97-AF65-F5344CB8AC3E}">
@@ -7553,6 +7624,901 @@
         </p:nvSpPr>
         <p:spPr>
           <a:xfrm>
+            <a:off x="467604" y="0"/>
+            <a:ext cx="8229600" cy="1143000"/>
+          </a:xfrm>
+          <a:prstGeom prst="rect">
+            <a:avLst/>
+          </a:prstGeom>
+        </p:spPr>
+        <p:txBody>
+          <a:bodyPr>
+            <a:normAutofit fontScale="97500"/>
+          </a:bodyPr>
+          <a:lstStyle>
+            <a:lvl1pPr algn="ctr" defTabSz="914400" rtl="0" eaLnBrk="1" latinLnBrk="0" hangingPunct="1">
+              <a:spcBef>
+                <a:spcPct val="0"/>
+              </a:spcBef>
+              <a:buNone/>
+              <a:defRPr sz="4400" kern="1200">
+                <a:solidFill>
+                  <a:schemeClr val="tx1"/>
+                </a:solidFill>
+                <a:latin typeface="+mj-lt"/>
+                <a:ea typeface="+mj-ea"/>
+                <a:cs typeface="+mj-cs"/>
+              </a:defRPr>
+            </a:lvl1pPr>
+          </a:lstStyle>
+          <a:p>
+            <a:r>
+              <a:rPr lang="pt-BR" dirty="0" smtClean="0">
+                <a:solidFill>
+                  <a:schemeClr val="bg2">
+                    <a:lumMod val="25000"/>
+                  </a:schemeClr>
+                </a:solidFill>
+                <a:latin typeface="Arial Black" panose="020B0A04020102020204" pitchFamily="34" charset="0"/>
+              </a:rPr>
+              <a:t>Cronograma(</a:t>
+            </a:r>
+            <a:r>
+              <a:rPr lang="pt-BR" dirty="0" err="1" smtClean="0">
+                <a:solidFill>
+                  <a:schemeClr val="bg2">
+                    <a:lumMod val="25000"/>
+                  </a:schemeClr>
+                </a:solidFill>
+                <a:latin typeface="Arial Black" panose="020B0A04020102020204" pitchFamily="34" charset="0"/>
+              </a:rPr>
+              <a:t>nov</a:t>
+            </a:r>
+            <a:r>
+              <a:rPr lang="pt-BR" dirty="0" smtClean="0">
+                <a:solidFill>
+                  <a:schemeClr val="bg2">
+                    <a:lumMod val="25000"/>
+                  </a:schemeClr>
+                </a:solidFill>
+                <a:latin typeface="Arial Black" panose="020B0A04020102020204" pitchFamily="34" charset="0"/>
+              </a:rPr>
+              <a:t>-dez)</a:t>
+            </a:r>
+            <a:endParaRPr lang="pt-BR" dirty="0">
+              <a:solidFill>
+                <a:schemeClr val="bg2">
+                  <a:lumMod val="25000"/>
+                </a:schemeClr>
+              </a:solidFill>
+              <a:latin typeface="Arial Black" panose="020B0A04020102020204" pitchFamily="34" charset="0"/>
+            </a:endParaRPr>
+          </a:p>
+        </p:txBody>
+      </p:sp>
+      <p:graphicFrame>
+        <p:nvGraphicFramePr>
+          <p:cNvPr id="3" name="Tabela 2"/>
+          <p:cNvGraphicFramePr>
+            <a:graphicFrameLocks noGrp="1"/>
+          </p:cNvGraphicFramePr>
+          <p:nvPr>
+            <p:extLst>
+              <p:ext uri="{D42A27DB-BD31-4B8C-83A1-F6EECF244321}">
+                <p14:modId xmlns:p14="http://schemas.microsoft.com/office/powerpoint/2010/main" val="3461033655"/>
+              </p:ext>
+            </p:extLst>
+          </p:nvPr>
+        </p:nvGraphicFramePr>
+        <p:xfrm>
+          <a:off x="904794" y="836712"/>
+          <a:ext cx="6691542" cy="5299271"/>
+        </p:xfrm>
+        <a:graphic>
+          <a:graphicData uri="http://schemas.openxmlformats.org/drawingml/2006/table">
+            <a:tbl>
+              <a:tblPr bandRow="1">
+                <a:tableStyleId>{5C22544A-7EE6-4342-B048-85BDC9FD1C3A}</a:tableStyleId>
+              </a:tblPr>
+              <a:tblGrid>
+                <a:gridCol w="3345771"/>
+                <a:gridCol w="3345771"/>
+              </a:tblGrid>
+              <a:tr h="1031268">
+                <a:tc>
+                  <a:txBody>
+                    <a:bodyPr/>
+                    <a:lstStyle/>
+                    <a:p>
+                      <a:r>
+                        <a:rPr lang="pt-BR" sz="1400" dirty="0" smtClean="0">
+                          <a:solidFill>
+                            <a:schemeClr val="tx1">
+                              <a:lumMod val="85000"/>
+                              <a:lumOff val="15000"/>
+                            </a:schemeClr>
+                          </a:solidFill>
+                          <a:effectLst/>
+                          <a:latin typeface="Arial Rounded MT Bold" panose="020F0704030504030204" pitchFamily="34" charset="0"/>
+                          <a:cs typeface="Arial" panose="020B0604020202020204" pitchFamily="34" charset="0"/>
+                        </a:rPr>
+                        <a:t>6ª semana(17/11-23/11)</a:t>
+                      </a:r>
+                      <a:endParaRPr lang="pt-BR" sz="1400" dirty="0">
+                        <a:solidFill>
+                          <a:schemeClr val="tx1">
+                            <a:lumMod val="85000"/>
+                            <a:lumOff val="15000"/>
+                          </a:schemeClr>
+                        </a:solidFill>
+                        <a:effectLst/>
+                        <a:latin typeface="Arial Rounded MT Bold" panose="020F0704030504030204" pitchFamily="34" charset="0"/>
+                        <a:cs typeface="Arial" panose="020B0604020202020204" pitchFamily="34" charset="0"/>
+                      </a:endParaRPr>
+                    </a:p>
+                  </a:txBody>
+                  <a:tcPr>
+                    <a:solidFill>
+                      <a:srgbClr val="00B0F0"/>
+                    </a:solidFill>
+                  </a:tcPr>
+                </a:tc>
+                <a:tc>
+                  <a:txBody>
+                    <a:bodyPr/>
+                    <a:lstStyle/>
+                    <a:p>
+                      <a:pPr marL="285750" indent="-285750">
+                        <a:buFont typeface="Arial" panose="020B0604020202020204" pitchFamily="34" charset="0"/>
+                        <a:buChar char="•"/>
+                      </a:pPr>
+                      <a:r>
+                        <a:rPr lang="pt-BR" sz="1400" baseline="0" dirty="0" smtClean="0">
+                          <a:solidFill>
+                            <a:schemeClr val="tx1">
+                              <a:lumMod val="85000"/>
+                              <a:lumOff val="15000"/>
+                            </a:schemeClr>
+                          </a:solidFill>
+                          <a:effectLst/>
+                          <a:latin typeface="Arial Rounded MT Bold" panose="020F0704030504030204" pitchFamily="34" charset="0"/>
+                          <a:cs typeface="Arial" panose="020B0604020202020204" pitchFamily="34" charset="0"/>
+                        </a:rPr>
+                        <a:t>3ª integração.</a:t>
+                      </a:r>
+                    </a:p>
+                    <a:p>
+                      <a:pPr marL="285750" indent="-285750">
+                        <a:buFont typeface="Arial" panose="020B0604020202020204" pitchFamily="34" charset="0"/>
+                        <a:buChar char="•"/>
+                      </a:pPr>
+                      <a:r>
+                        <a:rPr lang="pt-BR" sz="1400" baseline="0" dirty="0" smtClean="0">
+                          <a:solidFill>
+                            <a:schemeClr val="tx1">
+                              <a:lumMod val="85000"/>
+                              <a:lumOff val="15000"/>
+                            </a:schemeClr>
+                          </a:solidFill>
+                          <a:effectLst/>
+                          <a:latin typeface="Arial Rounded MT Bold" panose="020F0704030504030204" pitchFamily="34" charset="0"/>
+                          <a:cs typeface="Arial" panose="020B0604020202020204" pitchFamily="34" charset="0"/>
+                        </a:rPr>
+                        <a:t>3º teste.</a:t>
+                      </a:r>
+                    </a:p>
+                    <a:p>
+                      <a:pPr marL="285750" indent="-285750">
+                        <a:buFont typeface="Arial" panose="020B0604020202020204" pitchFamily="34" charset="0"/>
+                        <a:buChar char="•"/>
+                      </a:pPr>
+                      <a:r>
+                        <a:rPr lang="pt-BR" sz="1400" baseline="0" dirty="0" smtClean="0">
+                          <a:solidFill>
+                            <a:schemeClr val="tx1">
+                              <a:lumMod val="85000"/>
+                              <a:lumOff val="15000"/>
+                            </a:schemeClr>
+                          </a:solidFill>
+                          <a:effectLst/>
+                          <a:latin typeface="Arial Rounded MT Bold" panose="020F0704030504030204" pitchFamily="34" charset="0"/>
+                          <a:cs typeface="Arial" panose="020B0604020202020204" pitchFamily="34" charset="0"/>
+                        </a:rPr>
+                        <a:t>Manutenção das unidades.</a:t>
+                      </a:r>
+                    </a:p>
+                    <a:p>
+                      <a:pPr marL="285750" indent="-285750">
+                        <a:buFont typeface="Arial" panose="020B0604020202020204" pitchFamily="34" charset="0"/>
+                        <a:buChar char="•"/>
+                      </a:pPr>
+                      <a:r>
+                        <a:rPr lang="pt-BR" sz="1400" baseline="0" dirty="0" smtClean="0">
+                          <a:solidFill>
+                            <a:schemeClr val="tx1">
+                              <a:lumMod val="85000"/>
+                              <a:lumOff val="15000"/>
+                            </a:schemeClr>
+                          </a:solidFill>
+                          <a:effectLst/>
+                          <a:latin typeface="Arial Rounded MT Bold" panose="020F0704030504030204" pitchFamily="34" charset="0"/>
+                          <a:cs typeface="Arial" panose="020B0604020202020204" pitchFamily="34" charset="0"/>
+                        </a:rPr>
+                        <a:t>Implementação de novas classes.</a:t>
+                      </a:r>
+                      <a:endParaRPr lang="pt-BR" sz="1400" baseline="0" dirty="0" smtClean="0">
+                        <a:solidFill>
+                          <a:schemeClr val="tx1">
+                            <a:lumMod val="85000"/>
+                            <a:lumOff val="15000"/>
+                          </a:schemeClr>
+                        </a:solidFill>
+                        <a:effectLst/>
+                        <a:latin typeface="Arial Rounded MT Bold" panose="020F0704030504030204" pitchFamily="34" charset="0"/>
+                        <a:cs typeface="Arial" panose="020B0604020202020204" pitchFamily="34" charset="0"/>
+                      </a:endParaRPr>
+                    </a:p>
+                  </a:txBody>
+                  <a:tcPr>
+                    <a:solidFill>
+                      <a:srgbClr val="00B0F0"/>
+                    </a:solidFill>
+                  </a:tcPr>
+                </a:tc>
+              </a:tr>
+              <a:tr h="1153472">
+                <a:tc>
+                  <a:txBody>
+                    <a:bodyPr/>
+                    <a:lstStyle/>
+                    <a:p>
+                      <a:r>
+                        <a:rPr lang="pt-BR" sz="1400" dirty="0" smtClean="0">
+                          <a:solidFill>
+                            <a:schemeClr val="tx1">
+                              <a:lumMod val="85000"/>
+                              <a:lumOff val="15000"/>
+                            </a:schemeClr>
+                          </a:solidFill>
+                          <a:effectLst/>
+                          <a:latin typeface="Arial Rounded MT Bold" panose="020F0704030504030204" pitchFamily="34" charset="0"/>
+                          <a:cs typeface="Arial" panose="020B0604020202020204" pitchFamily="34" charset="0"/>
+                        </a:rPr>
+                        <a:t>7ª semana(24/11-30/11)</a:t>
+                      </a:r>
+                      <a:endParaRPr lang="pt-BR" sz="1400" dirty="0">
+                        <a:solidFill>
+                          <a:schemeClr val="tx1">
+                            <a:lumMod val="85000"/>
+                            <a:lumOff val="15000"/>
+                          </a:schemeClr>
+                        </a:solidFill>
+                        <a:effectLst/>
+                        <a:latin typeface="Arial Rounded MT Bold" panose="020F0704030504030204" pitchFamily="34" charset="0"/>
+                        <a:cs typeface="Arial" panose="020B0604020202020204" pitchFamily="34" charset="0"/>
+                      </a:endParaRPr>
+                    </a:p>
+                  </a:txBody>
+                  <a:tcPr>
+                    <a:solidFill>
+                      <a:srgbClr val="00B0F0"/>
+                    </a:solidFill>
+                  </a:tcPr>
+                </a:tc>
+                <a:tc>
+                  <a:txBody>
+                    <a:bodyPr/>
+                    <a:lstStyle/>
+                    <a:p>
+                      <a:pPr marL="285750" indent="-285750">
+                        <a:buFont typeface="Arial" panose="020B0604020202020204" pitchFamily="34" charset="0"/>
+                        <a:buChar char="•"/>
+                      </a:pPr>
+                      <a:r>
+                        <a:rPr lang="pt-BR" sz="1400" baseline="0" dirty="0" smtClean="0">
+                          <a:solidFill>
+                            <a:schemeClr val="tx1">
+                              <a:lumMod val="85000"/>
+                              <a:lumOff val="15000"/>
+                            </a:schemeClr>
+                          </a:solidFill>
+                          <a:effectLst/>
+                          <a:latin typeface="Arial Rounded MT Bold" panose="020F0704030504030204" pitchFamily="34" charset="0"/>
+                          <a:cs typeface="Arial" panose="020B0604020202020204" pitchFamily="34" charset="0"/>
+                        </a:rPr>
+                        <a:t>4ª integração.</a:t>
+                      </a:r>
+                    </a:p>
+                    <a:p>
+                      <a:pPr marL="285750" indent="-285750">
+                        <a:buFont typeface="Arial" panose="020B0604020202020204" pitchFamily="34" charset="0"/>
+                        <a:buChar char="•"/>
+                      </a:pPr>
+                      <a:r>
+                        <a:rPr lang="pt-BR" sz="1400" baseline="0" dirty="0" smtClean="0">
+                          <a:solidFill>
+                            <a:schemeClr val="tx1">
+                              <a:lumMod val="85000"/>
+                              <a:lumOff val="15000"/>
+                            </a:schemeClr>
+                          </a:solidFill>
+                          <a:effectLst/>
+                          <a:latin typeface="Arial Rounded MT Bold" panose="020F0704030504030204" pitchFamily="34" charset="0"/>
+                          <a:cs typeface="Arial" panose="020B0604020202020204" pitchFamily="34" charset="0"/>
+                        </a:rPr>
+                        <a:t>4º teste.</a:t>
+                      </a:r>
+                    </a:p>
+                    <a:p>
+                      <a:pPr marL="285750" indent="-285750">
+                        <a:buFont typeface="Arial" panose="020B0604020202020204" pitchFamily="34" charset="0"/>
+                        <a:buChar char="•"/>
+                      </a:pPr>
+                      <a:r>
+                        <a:rPr lang="pt-BR" sz="1400" baseline="0" dirty="0" smtClean="0">
+                          <a:solidFill>
+                            <a:schemeClr val="tx1">
+                              <a:lumMod val="85000"/>
+                              <a:lumOff val="15000"/>
+                            </a:schemeClr>
+                          </a:solidFill>
+                          <a:effectLst/>
+                          <a:latin typeface="Arial Rounded MT Bold" panose="020F0704030504030204" pitchFamily="34" charset="0"/>
+                          <a:cs typeface="Arial" panose="020B0604020202020204" pitchFamily="34" charset="0"/>
+                        </a:rPr>
+                        <a:t>Manutenção das unidades.</a:t>
+                      </a:r>
+                    </a:p>
+                    <a:p>
+                      <a:pPr marL="285750" indent="-285750">
+                        <a:buFont typeface="Arial" panose="020B0604020202020204" pitchFamily="34" charset="0"/>
+                        <a:buChar char="•"/>
+                      </a:pPr>
+                      <a:r>
+                        <a:rPr lang="pt-BR" sz="1400" baseline="0" dirty="0" smtClean="0">
+                          <a:solidFill>
+                            <a:schemeClr val="tx1">
+                              <a:lumMod val="85000"/>
+                              <a:lumOff val="15000"/>
+                            </a:schemeClr>
+                          </a:solidFill>
+                          <a:effectLst/>
+                          <a:latin typeface="Arial Rounded MT Bold" panose="020F0704030504030204" pitchFamily="34" charset="0"/>
+                          <a:cs typeface="Arial" panose="020B0604020202020204" pitchFamily="34" charset="0"/>
+                        </a:rPr>
+                        <a:t>Implementação de possíveis  novas classes.</a:t>
+                      </a:r>
+                      <a:endParaRPr lang="pt-BR" sz="1400" baseline="0" dirty="0" smtClean="0">
+                        <a:solidFill>
+                          <a:schemeClr val="tx1">
+                            <a:lumMod val="85000"/>
+                            <a:lumOff val="15000"/>
+                          </a:schemeClr>
+                        </a:solidFill>
+                        <a:effectLst/>
+                        <a:latin typeface="Arial Rounded MT Bold" panose="020F0704030504030204" pitchFamily="34" charset="0"/>
+                        <a:cs typeface="Arial" panose="020B0604020202020204" pitchFamily="34" charset="0"/>
+                      </a:endParaRPr>
+                    </a:p>
+                  </a:txBody>
+                  <a:tcPr>
+                    <a:solidFill>
+                      <a:srgbClr val="00B0F0"/>
+                    </a:solidFill>
+                  </a:tcPr>
+                </a:tc>
+              </a:tr>
+              <a:tr h="1031268">
+                <a:tc>
+                  <a:txBody>
+                    <a:bodyPr/>
+                    <a:lstStyle/>
+                    <a:p>
+                      <a:r>
+                        <a:rPr lang="pt-BR" sz="1400" dirty="0" smtClean="0">
+                          <a:solidFill>
+                            <a:schemeClr val="tx1">
+                              <a:lumMod val="85000"/>
+                              <a:lumOff val="15000"/>
+                            </a:schemeClr>
+                          </a:solidFill>
+                          <a:effectLst/>
+                          <a:latin typeface="Arial Rounded MT Bold" panose="020F0704030504030204" pitchFamily="34" charset="0"/>
+                          <a:cs typeface="Arial" panose="020B0604020202020204" pitchFamily="34" charset="0"/>
+                        </a:rPr>
+                        <a:t>8ª semana(01/12-07/10</a:t>
+                      </a:r>
+                      <a:r>
+                        <a:rPr lang="pt-BR" sz="1400" dirty="0" smtClean="0">
+                          <a:solidFill>
+                            <a:schemeClr val="tx1">
+                              <a:lumMod val="85000"/>
+                              <a:lumOff val="15000"/>
+                            </a:schemeClr>
+                          </a:solidFill>
+                          <a:effectLst/>
+                          <a:latin typeface="Arial Rounded MT Bold" panose="020F0704030504030204" pitchFamily="34" charset="0"/>
+                          <a:cs typeface="Arial" panose="020B0604020202020204" pitchFamily="34" charset="0"/>
+                        </a:rPr>
+                        <a:t>)</a:t>
+                      </a:r>
+                      <a:endParaRPr lang="pt-BR" sz="1400" dirty="0">
+                        <a:solidFill>
+                          <a:schemeClr val="tx1">
+                            <a:lumMod val="85000"/>
+                            <a:lumOff val="15000"/>
+                          </a:schemeClr>
+                        </a:solidFill>
+                        <a:effectLst/>
+                        <a:latin typeface="Arial Rounded MT Bold" panose="020F0704030504030204" pitchFamily="34" charset="0"/>
+                        <a:cs typeface="Arial" panose="020B0604020202020204" pitchFamily="34" charset="0"/>
+                      </a:endParaRPr>
+                    </a:p>
+                  </a:txBody>
+                  <a:tcPr>
+                    <a:solidFill>
+                      <a:srgbClr val="00B0F0"/>
+                    </a:solidFill>
+                  </a:tcPr>
+                </a:tc>
+                <a:tc>
+                  <a:txBody>
+                    <a:bodyPr/>
+                    <a:lstStyle/>
+                    <a:p>
+                      <a:pPr marL="285750" indent="-285750">
+                        <a:buFont typeface="Arial" panose="020B0604020202020204" pitchFamily="34" charset="0"/>
+                        <a:buChar char="•"/>
+                      </a:pPr>
+                      <a:r>
+                        <a:rPr lang="pt-BR" sz="1400" baseline="0" dirty="0" smtClean="0">
+                          <a:solidFill>
+                            <a:schemeClr val="tx1">
+                              <a:lumMod val="85000"/>
+                              <a:lumOff val="15000"/>
+                            </a:schemeClr>
+                          </a:solidFill>
+                          <a:effectLst/>
+                          <a:latin typeface="Arial Rounded MT Bold" panose="020F0704030504030204" pitchFamily="34" charset="0"/>
+                          <a:cs typeface="Arial" panose="020B0604020202020204" pitchFamily="34" charset="0"/>
+                        </a:rPr>
+                        <a:t>5ª integração.</a:t>
+                      </a:r>
+                    </a:p>
+                    <a:p>
+                      <a:pPr marL="285750" indent="-285750">
+                        <a:buFont typeface="Arial" panose="020B0604020202020204" pitchFamily="34" charset="0"/>
+                        <a:buChar char="•"/>
+                      </a:pPr>
+                      <a:r>
+                        <a:rPr lang="pt-BR" sz="1400" baseline="0" dirty="0" smtClean="0">
+                          <a:solidFill>
+                            <a:schemeClr val="tx1">
+                              <a:lumMod val="85000"/>
+                              <a:lumOff val="15000"/>
+                            </a:schemeClr>
+                          </a:solidFill>
+                          <a:effectLst/>
+                          <a:latin typeface="Arial Rounded MT Bold" panose="020F0704030504030204" pitchFamily="34" charset="0"/>
+                          <a:cs typeface="Arial" panose="020B0604020202020204" pitchFamily="34" charset="0"/>
+                        </a:rPr>
+                        <a:t>5º teste.</a:t>
+                      </a:r>
+                    </a:p>
+                    <a:p>
+                      <a:pPr marL="285750" indent="-285750">
+                        <a:buFont typeface="Arial" panose="020B0604020202020204" pitchFamily="34" charset="0"/>
+                        <a:buChar char="•"/>
+                      </a:pPr>
+                      <a:r>
+                        <a:rPr lang="pt-BR" sz="1400" baseline="0" dirty="0" smtClean="0">
+                          <a:solidFill>
+                            <a:schemeClr val="tx1">
+                              <a:lumMod val="85000"/>
+                              <a:lumOff val="15000"/>
+                            </a:schemeClr>
+                          </a:solidFill>
+                          <a:effectLst/>
+                          <a:latin typeface="Arial Rounded MT Bold" panose="020F0704030504030204" pitchFamily="34" charset="0"/>
+                          <a:cs typeface="Arial" panose="020B0604020202020204" pitchFamily="34" charset="0"/>
+                        </a:rPr>
+                        <a:t>Manutenção das unidades.</a:t>
+                      </a:r>
+                    </a:p>
+                    <a:p>
+                      <a:pPr marL="285750" indent="-285750">
+                        <a:buFont typeface="Arial" panose="020B0604020202020204" pitchFamily="34" charset="0"/>
+                        <a:buChar char="•"/>
+                      </a:pPr>
+                      <a:r>
+                        <a:rPr lang="pt-BR" sz="1400" baseline="0" dirty="0" smtClean="0">
+                          <a:solidFill>
+                            <a:schemeClr val="tx1">
+                              <a:lumMod val="85000"/>
+                              <a:lumOff val="15000"/>
+                            </a:schemeClr>
+                          </a:solidFill>
+                          <a:effectLst/>
+                          <a:latin typeface="Arial Rounded MT Bold" panose="020F0704030504030204" pitchFamily="34" charset="0"/>
+                          <a:cs typeface="Arial" panose="020B0604020202020204" pitchFamily="34" charset="0"/>
+                        </a:rPr>
+                        <a:t>Implementação de possíveis novas classes.</a:t>
+                      </a:r>
+                      <a:endParaRPr lang="pt-BR" sz="1400" baseline="0" dirty="0" smtClean="0">
+                        <a:solidFill>
+                          <a:schemeClr val="tx1">
+                            <a:lumMod val="85000"/>
+                            <a:lumOff val="15000"/>
+                          </a:schemeClr>
+                        </a:solidFill>
+                        <a:effectLst/>
+                        <a:latin typeface="Arial Rounded MT Bold" panose="020F0704030504030204" pitchFamily="34" charset="0"/>
+                        <a:cs typeface="Arial" panose="020B0604020202020204" pitchFamily="34" charset="0"/>
+                      </a:endParaRPr>
+                    </a:p>
+                  </a:txBody>
+                  <a:tcPr>
+                    <a:solidFill>
+                      <a:srgbClr val="00B0F0"/>
+                    </a:solidFill>
+                  </a:tcPr>
+                </a:tc>
+              </a:tr>
+              <a:tr h="793283">
+                <a:tc>
+                  <a:txBody>
+                    <a:bodyPr/>
+                    <a:lstStyle/>
+                    <a:p>
+                      <a:r>
+                        <a:rPr lang="pt-BR" sz="1400" dirty="0" smtClean="0">
+                          <a:solidFill>
+                            <a:schemeClr val="tx1">
+                              <a:lumMod val="85000"/>
+                              <a:lumOff val="15000"/>
+                            </a:schemeClr>
+                          </a:solidFill>
+                          <a:effectLst/>
+                          <a:latin typeface="Arial Rounded MT Bold" panose="020F0704030504030204" pitchFamily="34" charset="0"/>
+                          <a:cs typeface="Arial" panose="020B0604020202020204" pitchFamily="34" charset="0"/>
+                        </a:rPr>
+                        <a:t>última semana(08/12-14/12)</a:t>
+                      </a:r>
+                      <a:endParaRPr lang="pt-BR" sz="1400" dirty="0">
+                        <a:solidFill>
+                          <a:schemeClr val="tx1">
+                            <a:lumMod val="85000"/>
+                            <a:lumOff val="15000"/>
+                          </a:schemeClr>
+                        </a:solidFill>
+                        <a:effectLst/>
+                        <a:latin typeface="Arial Rounded MT Bold" panose="020F0704030504030204" pitchFamily="34" charset="0"/>
+                        <a:cs typeface="Arial" panose="020B0604020202020204" pitchFamily="34" charset="0"/>
+                      </a:endParaRPr>
+                    </a:p>
+                  </a:txBody>
+                  <a:tcPr>
+                    <a:solidFill>
+                      <a:srgbClr val="00B0F0"/>
+                    </a:solidFill>
+                  </a:tcPr>
+                </a:tc>
+                <a:tc>
+                  <a:txBody>
+                    <a:bodyPr/>
+                    <a:lstStyle/>
+                    <a:p>
+                      <a:pPr marL="285750" indent="-285750">
+                        <a:buFont typeface="Arial" panose="020B0604020202020204" pitchFamily="34" charset="0"/>
+                        <a:buChar char="•"/>
+                      </a:pPr>
+                      <a:r>
+                        <a:rPr lang="pt-BR" sz="1400" dirty="0" smtClean="0">
+                          <a:solidFill>
+                            <a:schemeClr val="tx1">
+                              <a:lumMod val="85000"/>
+                              <a:lumOff val="15000"/>
+                            </a:schemeClr>
+                          </a:solidFill>
+                          <a:effectLst/>
+                          <a:latin typeface="Arial Rounded MT Bold" panose="020F0704030504030204" pitchFamily="34" charset="0"/>
+                          <a:cs typeface="Arial" panose="020B0604020202020204" pitchFamily="34" charset="0"/>
+                        </a:rPr>
+                        <a:t>Testes finais</a:t>
+                      </a:r>
+                      <a:endParaRPr lang="pt-BR" sz="1400" baseline="0" dirty="0" smtClean="0">
+                        <a:solidFill>
+                          <a:schemeClr val="tx1">
+                            <a:lumMod val="85000"/>
+                            <a:lumOff val="15000"/>
+                          </a:schemeClr>
+                        </a:solidFill>
+                        <a:effectLst/>
+                        <a:latin typeface="Arial Rounded MT Bold" panose="020F0704030504030204" pitchFamily="34" charset="0"/>
+                        <a:cs typeface="Arial" panose="020B0604020202020204" pitchFamily="34" charset="0"/>
+                      </a:endParaRPr>
+                    </a:p>
+                    <a:p>
+                      <a:pPr marL="285750" indent="-285750">
+                        <a:buFont typeface="Arial" panose="020B0604020202020204" pitchFamily="34" charset="0"/>
+                        <a:buChar char="•"/>
+                      </a:pPr>
+                      <a:r>
+                        <a:rPr lang="pt-BR" sz="1400" baseline="0" smtClean="0">
+                          <a:solidFill>
+                            <a:schemeClr val="tx1">
+                              <a:lumMod val="85000"/>
+                              <a:lumOff val="15000"/>
+                            </a:schemeClr>
+                          </a:solidFill>
+                          <a:effectLst/>
+                          <a:latin typeface="Arial Rounded MT Bold" panose="020F0704030504030204" pitchFamily="34" charset="0"/>
+                          <a:cs typeface="Arial" panose="020B0604020202020204" pitchFamily="34" charset="0"/>
+                        </a:rPr>
+                        <a:t>Manutenção final.</a:t>
+                      </a:r>
+                      <a:endParaRPr lang="pt-BR" sz="1400" baseline="0" dirty="0" smtClean="0">
+                        <a:solidFill>
+                          <a:schemeClr val="tx1">
+                            <a:lumMod val="85000"/>
+                            <a:lumOff val="15000"/>
+                          </a:schemeClr>
+                        </a:solidFill>
+                        <a:effectLst/>
+                        <a:latin typeface="Arial Rounded MT Bold" panose="020F0704030504030204" pitchFamily="34" charset="0"/>
+                        <a:cs typeface="Arial" panose="020B0604020202020204" pitchFamily="34" charset="0"/>
+                      </a:endParaRPr>
+                    </a:p>
+                  </a:txBody>
+                  <a:tcPr>
+                    <a:solidFill>
+                      <a:srgbClr val="00B0F0"/>
+                    </a:solidFill>
+                  </a:tcPr>
+                </a:tc>
+              </a:tr>
+              <a:tr h="1031268">
+                <a:tc>
+                  <a:txBody>
+                    <a:bodyPr/>
+                    <a:lstStyle/>
+                    <a:p>
+                      <a:r>
+                        <a:rPr lang="pt-BR" sz="1400" dirty="0" smtClean="0">
+                          <a:solidFill>
+                            <a:schemeClr val="tx1">
+                              <a:lumMod val="85000"/>
+                              <a:lumOff val="15000"/>
+                            </a:schemeClr>
+                          </a:solidFill>
+                          <a:effectLst/>
+                          <a:latin typeface="Arial Rounded MT Bold" panose="020F0704030504030204" pitchFamily="34" charset="0"/>
+                          <a:cs typeface="Arial" panose="020B0604020202020204" pitchFamily="34" charset="0"/>
+                        </a:rPr>
+                        <a:t>15/12</a:t>
+                      </a:r>
+                      <a:endParaRPr lang="pt-BR" sz="1400" dirty="0">
+                        <a:solidFill>
+                          <a:schemeClr val="tx1">
+                            <a:lumMod val="85000"/>
+                            <a:lumOff val="15000"/>
+                          </a:schemeClr>
+                        </a:solidFill>
+                        <a:effectLst/>
+                        <a:latin typeface="Arial Rounded MT Bold" panose="020F0704030504030204" pitchFamily="34" charset="0"/>
+                        <a:cs typeface="Arial" panose="020B0604020202020204" pitchFamily="34" charset="0"/>
+                      </a:endParaRPr>
+                    </a:p>
+                  </a:txBody>
+                  <a:tcPr>
+                    <a:solidFill>
+                      <a:srgbClr val="00B0F0"/>
+                    </a:solidFill>
+                  </a:tcPr>
+                </a:tc>
+                <a:tc>
+                  <a:txBody>
+                    <a:bodyPr/>
+                    <a:lstStyle/>
+                    <a:p>
+                      <a:pPr marL="285750" indent="-285750">
+                        <a:buFont typeface="Arial" panose="020B0604020202020204" pitchFamily="34" charset="0"/>
+                        <a:buChar char="•"/>
+                      </a:pPr>
+                      <a:r>
+                        <a:rPr lang="pt-BR" sz="1400" dirty="0" smtClean="0">
+                          <a:solidFill>
+                            <a:schemeClr val="tx1">
+                              <a:lumMod val="85000"/>
+                              <a:lumOff val="15000"/>
+                            </a:schemeClr>
+                          </a:solidFill>
+                          <a:effectLst/>
+                          <a:latin typeface="Arial Rounded MT Bold" panose="020F0704030504030204" pitchFamily="34" charset="0"/>
+                          <a:cs typeface="Arial" panose="020B0604020202020204" pitchFamily="34" charset="0"/>
+                        </a:rPr>
+                        <a:t>Apresentação</a:t>
+                      </a:r>
+                      <a:r>
+                        <a:rPr lang="pt-BR" sz="1400" baseline="0" dirty="0" smtClean="0">
+                          <a:solidFill>
+                            <a:schemeClr val="tx1">
+                              <a:lumMod val="85000"/>
+                              <a:lumOff val="15000"/>
+                            </a:schemeClr>
+                          </a:solidFill>
+                          <a:effectLst/>
+                          <a:latin typeface="Arial Rounded MT Bold" panose="020F0704030504030204" pitchFamily="34" charset="0"/>
+                          <a:cs typeface="Arial" panose="020B0604020202020204" pitchFamily="34" charset="0"/>
+                        </a:rPr>
+                        <a:t> e entrega do software.</a:t>
+                      </a:r>
+                      <a:endParaRPr lang="pt-BR" sz="1400" dirty="0" smtClean="0">
+                        <a:solidFill>
+                          <a:schemeClr val="tx1">
+                            <a:lumMod val="85000"/>
+                            <a:lumOff val="15000"/>
+                          </a:schemeClr>
+                        </a:solidFill>
+                        <a:effectLst/>
+                        <a:latin typeface="Arial Rounded MT Bold" panose="020F0704030504030204" pitchFamily="34" charset="0"/>
+                        <a:cs typeface="Arial" panose="020B0604020202020204" pitchFamily="34" charset="0"/>
+                      </a:endParaRPr>
+                    </a:p>
+                    <a:p>
+                      <a:pPr marL="285750" indent="-285750">
+                        <a:buFont typeface="Arial" panose="020B0604020202020204" pitchFamily="34" charset="0"/>
+                        <a:buChar char="•"/>
+                      </a:pPr>
+                      <a:endParaRPr lang="pt-BR" sz="1400" dirty="0">
+                        <a:solidFill>
+                          <a:schemeClr val="tx1">
+                            <a:lumMod val="85000"/>
+                            <a:lumOff val="15000"/>
+                          </a:schemeClr>
+                        </a:solidFill>
+                        <a:effectLst/>
+                        <a:latin typeface="Arial Rounded MT Bold" panose="020F0704030504030204" pitchFamily="34" charset="0"/>
+                        <a:cs typeface="Arial" panose="020B0604020202020204" pitchFamily="34" charset="0"/>
+                      </a:endParaRPr>
+                    </a:p>
+                  </a:txBody>
+                  <a:tcPr>
+                    <a:solidFill>
+                      <a:srgbClr val="00B0F0"/>
+                    </a:solidFill>
+                  </a:tcPr>
+                </a:tc>
+              </a:tr>
+            </a:tbl>
+          </a:graphicData>
+        </a:graphic>
+      </p:graphicFrame>
+      <p:sp>
+        <p:nvSpPr>
+          <p:cNvPr id="6" name="AutoShape 2" descr="http://upload.wikimedia.org/wikipedia/commons/e/eb/Blue_check.svg"/>
+          <p:cNvSpPr>
+            <a:spLocks noChangeAspect="1" noChangeArrowheads="1"/>
+          </p:cNvSpPr>
+          <p:nvPr/>
+        </p:nvSpPr>
+        <p:spPr bwMode="auto">
+          <a:xfrm>
+            <a:off x="155575" y="-144463"/>
+            <a:ext cx="304800" cy="304801"/>
+          </a:xfrm>
+          <a:prstGeom prst="rect">
+            <a:avLst/>
+          </a:prstGeom>
+          <a:noFill/>
+          <a:extLst>
+            <a:ext uri="{909E8E84-426E-40DD-AFC4-6F175D3DCCD1}">
+              <a14:hiddenFill xmlns:a14="http://schemas.microsoft.com/office/drawing/2010/main">
+                <a:solidFill>
+                  <a:srgbClr val="FFFFFF"/>
+                </a:solidFill>
+              </a14:hiddenFill>
+            </a:ext>
+          </a:extLst>
+        </p:spPr>
+        <p:txBody>
+          <a:bodyPr vert="horz" wrap="square" lIns="91440" tIns="45720" rIns="91440" bIns="45720" numCol="1" anchor="t" anchorCtr="0" compatLnSpc="1">
+            <a:prstTxWarp prst="textNoShape">
+              <a:avLst/>
+            </a:prstTxWarp>
+          </a:bodyPr>
+          <a:lstStyle/>
+          <a:p>
+            <a:endParaRPr lang="pt-BR"/>
+          </a:p>
+        </p:txBody>
+      </p:sp>
+      <p:sp>
+        <p:nvSpPr>
+          <p:cNvPr id="8" name="AutoShape 4" descr="http://upload.wikimedia.org/wikipedia/commons/e/eb/Blue_check.svg"/>
+          <p:cNvSpPr>
+            <a:spLocks noChangeAspect="1" noChangeArrowheads="1"/>
+          </p:cNvSpPr>
+          <p:nvPr/>
+        </p:nvSpPr>
+        <p:spPr bwMode="auto">
+          <a:xfrm>
+            <a:off x="307975" y="7937"/>
+            <a:ext cx="304800" cy="304801"/>
+          </a:xfrm>
+          <a:prstGeom prst="rect">
+            <a:avLst/>
+          </a:prstGeom>
+          <a:noFill/>
+          <a:extLst>
+            <a:ext uri="{909E8E84-426E-40DD-AFC4-6F175D3DCCD1}">
+              <a14:hiddenFill xmlns:a14="http://schemas.microsoft.com/office/drawing/2010/main">
+                <a:solidFill>
+                  <a:srgbClr val="FFFFFF"/>
+                </a:solidFill>
+              </a14:hiddenFill>
+            </a:ext>
+          </a:extLst>
+        </p:spPr>
+        <p:txBody>
+          <a:bodyPr vert="horz" wrap="square" lIns="91440" tIns="45720" rIns="91440" bIns="45720" numCol="1" anchor="t" anchorCtr="0" compatLnSpc="1">
+            <a:prstTxWarp prst="textNoShape">
+              <a:avLst/>
+            </a:prstTxWarp>
+          </a:bodyPr>
+          <a:lstStyle/>
+          <a:p>
+            <a:endParaRPr lang="pt-BR"/>
+          </a:p>
+        </p:txBody>
+      </p:sp>
+    </p:spTree>
+    <p:extLst>
+      <p:ext uri="{BB962C8B-B14F-4D97-AF65-F5344CB8AC3E}">
+        <p14:creationId xmlns:p14="http://schemas.microsoft.com/office/powerpoint/2010/main" val="3736766264"/>
+      </p:ext>
+    </p:extLst>
+  </p:cSld>
+  <p:clrMapOvr>
+    <a:masterClrMapping/>
+  </p:clrMapOvr>
+  <p:timing>
+    <p:tnLst>
+      <p:par>
+        <p:cTn id="1" dur="indefinite" restart="never" nodeType="tmRoot"/>
+      </p:par>
+    </p:tnLst>
+  </p:timing>
+</p:sld>
+</file>
+
+<file path=ppt/slides/slide13.xml><?xml version="1.0" encoding="utf-8"?>
+<p:sld xmlns:a="http://schemas.openxmlformats.org/drawingml/2006/main" xmlns:r="http://schemas.openxmlformats.org/officeDocument/2006/relationships" xmlns:p="http://schemas.openxmlformats.org/presentationml/2006/main">
+  <p:cSld>
+    <p:spTree>
+      <p:nvGrpSpPr>
+        <p:cNvPr id="1" name=""/>
+        <p:cNvGrpSpPr/>
+        <p:nvPr/>
+      </p:nvGrpSpPr>
+      <p:grpSpPr>
+        <a:xfrm>
+          <a:off x="0" y="0"/>
+          <a:ext cx="0" cy="0"/>
+          <a:chOff x="0" y="0"/>
+          <a:chExt cx="0" cy="0"/>
+        </a:xfrm>
+      </p:grpSpPr>
+      <p:sp>
+        <p:nvSpPr>
+          <p:cNvPr id="2" name="Título 1"/>
+          <p:cNvSpPr txBox="1">
+            <a:spLocks/>
+          </p:cNvSpPr>
+          <p:nvPr/>
+        </p:nvSpPr>
+        <p:spPr>
+          <a:xfrm>
             <a:off x="457200" y="2857500"/>
             <a:ext cx="8229600" cy="1143000"/>
           </a:xfrm>
@@ -7623,7 +8589,7 @@
 </p:sld>
 </file>
 
-<file path=ppt/slides/slide13.xml><?xml version="1.0" encoding="utf-8"?>
+<file path=ppt/slides/slide14.xml><?xml version="1.0" encoding="utf-8"?>
 <p:sld xmlns:a="http://schemas.openxmlformats.org/drawingml/2006/main" xmlns:r="http://schemas.openxmlformats.org/officeDocument/2006/relationships" xmlns:p="http://schemas.openxmlformats.org/presentationml/2006/main">
   <p:cSld>
     <p:spTree>

</xml_diff>

<commit_message>
reestruturando alguns elementos do software
</commit_message>
<xml_diff>
--- a/OdontoProj/Controle de Consultório Odontológico-turma 610.pptx
+++ b/OdontoProj/Controle de Consultório Odontológico-turma 610.pptx
@@ -7172,17 +7172,6 @@
                         </a:rPr>
                         <a:t>Integração com o sistema.</a:t>
                       </a:r>
-                      <a:endParaRPr lang="pt-BR" sz="1400" baseline="0" dirty="0" smtClean="0">
-                        <a:solidFill>
-                          <a:schemeClr val="tx1">
-                            <a:lumMod val="85000"/>
-                            <a:lumOff val="15000"/>
-                          </a:schemeClr>
-                        </a:solidFill>
-                        <a:effectLst/>
-                        <a:latin typeface="Arial Rounded MT Bold" panose="020F0704030504030204" pitchFamily="34" charset="0"/>
-                        <a:cs typeface="Arial" panose="020B0604020202020204" pitchFamily="34" charset="0"/>
-                      </a:endParaRPr>
                     </a:p>
                   </a:txBody>
                   <a:tcPr>
@@ -7846,17 +7835,6 @@
                         </a:rPr>
                         <a:t>Implementação de novas classes.</a:t>
                       </a:r>
-                      <a:endParaRPr lang="pt-BR" sz="1400" baseline="0" dirty="0" smtClean="0">
-                        <a:solidFill>
-                          <a:schemeClr val="tx1">
-                            <a:lumMod val="85000"/>
-                            <a:lumOff val="15000"/>
-                          </a:schemeClr>
-                        </a:solidFill>
-                        <a:effectLst/>
-                        <a:latin typeface="Arial Rounded MT Bold" panose="020F0704030504030204" pitchFamily="34" charset="0"/>
-                        <a:cs typeface="Arial" panose="020B0604020202020204" pitchFamily="34" charset="0"/>
-                      </a:endParaRPr>
                     </a:p>
                   </a:txBody>
                   <a:tcPr>
@@ -7988,17 +7966,6 @@
                         </a:rPr>
                         <a:t>Implementação de possíveis  novas classes.</a:t>
                       </a:r>
-                      <a:endParaRPr lang="pt-BR" sz="1400" baseline="0" dirty="0" smtClean="0">
-                        <a:solidFill>
-                          <a:schemeClr val="tx1">
-                            <a:lumMod val="85000"/>
-                            <a:lumOff val="15000"/>
-                          </a:schemeClr>
-                        </a:solidFill>
-                        <a:effectLst/>
-                        <a:latin typeface="Arial Rounded MT Bold" panose="020F0704030504030204" pitchFamily="34" charset="0"/>
-                        <a:cs typeface="Arial" panose="020B0604020202020204" pitchFamily="34" charset="0"/>
-                      </a:endParaRPr>
                     </a:p>
                   </a:txBody>
                   <a:tcPr>
@@ -8026,21 +7993,7 @@
                           <a:latin typeface="Arial Rounded MT Bold" panose="020F0704030504030204" pitchFamily="34" charset="0"/>
                           <a:cs typeface="Arial" panose="020B0604020202020204" pitchFamily="34" charset="0"/>
                         </a:rPr>
-                        <a:t>8ª semana(01/12-07/10</a:t>
-                      </a:r>
-                      <a:r>
-                        <a:rPr lang="pt-BR" sz="1400" dirty="0" smtClean="0">
-                          <a:solidFill>
-                            <a:schemeClr val="tx1">
-                              <a:lumMod val="85000"/>
-                              <a:lumOff val="15000"/>
-                            </a:schemeClr>
-                          </a:solidFill>
-                          <a:effectLst/>
-                          <a:latin typeface="Arial Rounded MT Bold" panose="020F0704030504030204" pitchFamily="34" charset="0"/>
-                          <a:cs typeface="Arial" panose="020B0604020202020204" pitchFamily="34" charset="0"/>
-                        </a:rPr>
-                        <a:t>)</a:t>
+                        <a:t>8ª semana(01/12-07/10)</a:t>
                       </a:r>
                       <a:endParaRPr lang="pt-BR" sz="1400" dirty="0">
                         <a:solidFill>
@@ -8144,17 +8097,6 @@
                         </a:rPr>
                         <a:t>Implementação de possíveis novas classes.</a:t>
                       </a:r>
-                      <a:endParaRPr lang="pt-BR" sz="1400" baseline="0" dirty="0" smtClean="0">
-                        <a:solidFill>
-                          <a:schemeClr val="tx1">
-                            <a:lumMod val="85000"/>
-                            <a:lumOff val="15000"/>
-                          </a:schemeClr>
-                        </a:solidFill>
-                        <a:effectLst/>
-                        <a:latin typeface="Arial Rounded MT Bold" panose="020F0704030504030204" pitchFamily="34" charset="0"/>
-                        <a:cs typeface="Arial" panose="020B0604020202020204" pitchFamily="34" charset="0"/>
-                      </a:endParaRPr>
                     </a:p>
                   </a:txBody>
                   <a:tcPr>
@@ -9126,7 +9068,7 @@
         <p:spPr>
           <a:xfrm>
             <a:off x="710006" y="1124744"/>
-            <a:ext cx="7704856" cy="4524315"/>
+            <a:ext cx="7704856" cy="4278094"/>
           </a:xfrm>
           <a:prstGeom prst="rect">
             <a:avLst/>
@@ -9468,8 +9410,41 @@
                 <a:latin typeface="Arial Rounded MT Bold" panose="020F0704030504030204" pitchFamily="34" charset="0"/>
                 <a:cs typeface="Arial" panose="020B0604020202020204" pitchFamily="34" charset="0"/>
               </a:rPr>
-              <a:t> responsável por ele e um preço total, que  é a soma dos preços dos serviços.</a:t>
-            </a:r>
+              <a:t> responsável por ele e um </a:t>
+            </a:r>
+            <a:r>
+              <a:rPr lang="pt-BR" sz="1600" smtClean="0">
+                <a:solidFill>
+                  <a:schemeClr val="bg2">
+                    <a:lumMod val="50000"/>
+                  </a:schemeClr>
+                </a:solidFill>
+                <a:latin typeface="Arial Rounded MT Bold" panose="020F0704030504030204" pitchFamily="34" charset="0"/>
+                <a:cs typeface="Arial" panose="020B0604020202020204" pitchFamily="34" charset="0"/>
+              </a:rPr>
+              <a:t>preço </a:t>
+            </a:r>
+            <a:r>
+              <a:rPr lang="pt-BR" sz="1600" smtClean="0">
+                <a:solidFill>
+                  <a:schemeClr val="bg2">
+                    <a:lumMod val="50000"/>
+                  </a:schemeClr>
+                </a:solidFill>
+                <a:latin typeface="Arial Rounded MT Bold" panose="020F0704030504030204" pitchFamily="34" charset="0"/>
+                <a:cs typeface="Arial" panose="020B0604020202020204" pitchFamily="34" charset="0"/>
+              </a:rPr>
+              <a:t>total.</a:t>
+            </a:r>
+            <a:endParaRPr lang="pt-BR" sz="1600" dirty="0" smtClean="0">
+              <a:solidFill>
+                <a:schemeClr val="bg2">
+                  <a:lumMod val="50000"/>
+                </a:schemeClr>
+              </a:solidFill>
+              <a:latin typeface="Arial Rounded MT Bold" panose="020F0704030504030204" pitchFamily="34" charset="0"/>
+              <a:cs typeface="Arial" panose="020B0604020202020204" pitchFamily="34" charset="0"/>
+            </a:endParaRPr>
           </a:p>
           <a:p>
             <a:pPr marL="285750" indent="-285750">

</xml_diff>